<commit_message>
Added Response and Requests files, renamed player.json and player.xml to PlayerResponse, and Modified Presentation.
</commit_message>
<xml_diff>
--- a/APIDocPresentation.pptx
+++ b/APIDocPresentation.pptx
@@ -123,7 +123,7 @@
   <pc:docChgLst>
     <pc:chgData name="Saber Heart" userId="fb8b8a421b0903ca" providerId="LiveId" clId="{BFC64E79-A38C-45EF-969B-1EBFFF4C3840}"/>
     <pc:docChg chg="custSel addSld modSld">
-      <pc:chgData name="Saber Heart" userId="fb8b8a421b0903ca" providerId="LiveId" clId="{BFC64E79-A38C-45EF-969B-1EBFFF4C3840}" dt="2017-11-05T05:21:13.553" v="1909" actId="20577"/>
+      <pc:chgData name="Saber Heart" userId="fb8b8a421b0903ca" providerId="LiveId" clId="{BFC64E79-A38C-45EF-969B-1EBFFF4C3840}" dt="2017-11-05T16:16:13.507" v="2165" actId="20577"/>
       <pc:docMkLst>
         <pc:docMk/>
       </pc:docMkLst>
@@ -243,7 +243,7 @@
         </pc:spChg>
       </pc:sldChg>
       <pc:sldChg chg="modSp add">
-        <pc:chgData name="Saber Heart" userId="fb8b8a421b0903ca" providerId="LiveId" clId="{BFC64E79-A38C-45EF-969B-1EBFFF4C3840}" dt="2017-11-05T05:21:13.553" v="1909" actId="20577"/>
+        <pc:chgData name="Saber Heart" userId="fb8b8a421b0903ca" providerId="LiveId" clId="{BFC64E79-A38C-45EF-969B-1EBFFF4C3840}" dt="2017-11-05T16:16:13.507" v="2165" actId="20577"/>
         <pc:sldMkLst>
           <pc:docMk/>
           <pc:sldMk cId="2886208190" sldId="262"/>
@@ -257,7 +257,7 @@
           </ac:spMkLst>
         </pc:spChg>
         <pc:spChg chg="mod">
-          <ac:chgData name="Saber Heart" userId="fb8b8a421b0903ca" providerId="LiveId" clId="{BFC64E79-A38C-45EF-969B-1EBFFF4C3840}" dt="2017-11-05T05:21:13.553" v="1909" actId="20577"/>
+          <ac:chgData name="Saber Heart" userId="fb8b8a421b0903ca" providerId="LiveId" clId="{BFC64E79-A38C-45EF-969B-1EBFFF4C3840}" dt="2017-11-05T16:16:13.507" v="2165" actId="20577"/>
           <ac:spMkLst>
             <pc:docMk/>
             <pc:sldMk cId="2886208190" sldId="262"/>
@@ -417,7 +417,7 @@
           <a:p>
             <a:fld id="{CC4FF940-D56D-4F52-9CB1-54894350CBF5}" type="datetimeFigureOut">
               <a:rPr lang="en-US" smtClean="0"/>
-              <a:t>11/4/2017</a:t>
+              <a:t>11/5/2017</a:t>
             </a:fld>
             <a:endParaRPr lang="en-US"/>
           </a:p>
@@ -615,7 +615,7 @@
           <a:p>
             <a:fld id="{CC4FF940-D56D-4F52-9CB1-54894350CBF5}" type="datetimeFigureOut">
               <a:rPr lang="en-US" smtClean="0"/>
-              <a:t>11/4/2017</a:t>
+              <a:t>11/5/2017</a:t>
             </a:fld>
             <a:endParaRPr lang="en-US"/>
           </a:p>
@@ -823,7 +823,7 @@
           <a:p>
             <a:fld id="{CC4FF940-D56D-4F52-9CB1-54894350CBF5}" type="datetimeFigureOut">
               <a:rPr lang="en-US" smtClean="0"/>
-              <a:t>11/4/2017</a:t>
+              <a:t>11/5/2017</a:t>
             </a:fld>
             <a:endParaRPr lang="en-US"/>
           </a:p>
@@ -1021,7 +1021,7 @@
           <a:p>
             <a:fld id="{CC4FF940-D56D-4F52-9CB1-54894350CBF5}" type="datetimeFigureOut">
               <a:rPr lang="en-US" smtClean="0"/>
-              <a:t>11/4/2017</a:t>
+              <a:t>11/5/2017</a:t>
             </a:fld>
             <a:endParaRPr lang="en-US"/>
           </a:p>
@@ -1296,7 +1296,7 @@
           <a:p>
             <a:fld id="{CC4FF940-D56D-4F52-9CB1-54894350CBF5}" type="datetimeFigureOut">
               <a:rPr lang="en-US" smtClean="0"/>
-              <a:t>11/4/2017</a:t>
+              <a:t>11/5/2017</a:t>
             </a:fld>
             <a:endParaRPr lang="en-US"/>
           </a:p>
@@ -1561,7 +1561,7 @@
           <a:p>
             <a:fld id="{CC4FF940-D56D-4F52-9CB1-54894350CBF5}" type="datetimeFigureOut">
               <a:rPr lang="en-US" smtClean="0"/>
-              <a:t>11/4/2017</a:t>
+              <a:t>11/5/2017</a:t>
             </a:fld>
             <a:endParaRPr lang="en-US"/>
           </a:p>
@@ -1973,7 +1973,7 @@
           <a:p>
             <a:fld id="{CC4FF940-D56D-4F52-9CB1-54894350CBF5}" type="datetimeFigureOut">
               <a:rPr lang="en-US" smtClean="0"/>
-              <a:t>11/4/2017</a:t>
+              <a:t>11/5/2017</a:t>
             </a:fld>
             <a:endParaRPr lang="en-US"/>
           </a:p>
@@ -2114,7 +2114,7 @@
           <a:p>
             <a:fld id="{CC4FF940-D56D-4F52-9CB1-54894350CBF5}" type="datetimeFigureOut">
               <a:rPr lang="en-US" smtClean="0"/>
-              <a:t>11/4/2017</a:t>
+              <a:t>11/5/2017</a:t>
             </a:fld>
             <a:endParaRPr lang="en-US"/>
           </a:p>
@@ -2227,7 +2227,7 @@
           <a:p>
             <a:fld id="{CC4FF940-D56D-4F52-9CB1-54894350CBF5}" type="datetimeFigureOut">
               <a:rPr lang="en-US" smtClean="0"/>
-              <a:t>11/4/2017</a:t>
+              <a:t>11/5/2017</a:t>
             </a:fld>
             <a:endParaRPr lang="en-US"/>
           </a:p>
@@ -2538,7 +2538,7 @@
           <a:p>
             <a:fld id="{CC4FF940-D56D-4F52-9CB1-54894350CBF5}" type="datetimeFigureOut">
               <a:rPr lang="en-US" smtClean="0"/>
-              <a:t>11/4/2017</a:t>
+              <a:t>11/5/2017</a:t>
             </a:fld>
             <a:endParaRPr lang="en-US"/>
           </a:p>
@@ -2826,7 +2826,7 @@
           <a:p>
             <a:fld id="{CC4FF940-D56D-4F52-9CB1-54894350CBF5}" type="datetimeFigureOut">
               <a:rPr lang="en-US" smtClean="0"/>
-              <a:t>11/4/2017</a:t>
+              <a:t>11/5/2017</a:t>
             </a:fld>
             <a:endParaRPr lang="en-US"/>
           </a:p>
@@ -3067,7 +3067,7 @@
           <a:p>
             <a:fld id="{CC4FF940-D56D-4F52-9CB1-54894350CBF5}" type="datetimeFigureOut">
               <a:rPr lang="en-US" smtClean="0"/>
-              <a:t>11/4/2017</a:t>
+              <a:t>11/5/2017</a:t>
             </a:fld>
             <a:endParaRPr lang="en-US"/>
           </a:p>
@@ -4286,9 +4286,31 @@
               <a:rPr lang="en-US" dirty="0" err="1"/>
               <a:t>MarkDown</a:t>
             </a:r>
-            <a:endParaRPr lang="en-US"/>
-          </a:p>
-          <a:p>
+            <a:endParaRPr lang="en-US" dirty="0"/>
+          </a:p>
+          <a:p>
+            <a:r>
+              <a:rPr lang="en-US" dirty="0"/>
+              <a:t>Things to note before the examples.</a:t>
+            </a:r>
+          </a:p>
+          <a:p>
+            <a:pPr lvl="1"/>
+            <a:r>
+              <a:rPr lang="en-US" dirty="0"/>
+              <a:t>You only need one table for both XML and JSON if the API supports both</a:t>
+            </a:r>
+          </a:p>
+          <a:p>
+            <a:pPr lvl="1"/>
+            <a:r>
+              <a:rPr lang="en-US" dirty="0"/>
+              <a:t>The XML response is not written </a:t>
+            </a:r>
+            <a:r>
+              <a:rPr lang="en-US"/>
+              <a:t>using attributes</a:t>
+            </a:r>
             <a:endParaRPr lang="en-US" dirty="0"/>
           </a:p>
         </p:txBody>

</xml_diff>

<commit_message>
Adds links to the the github repository in each of md files and a link in the PowerPoint to the presentation.
</commit_message>
<xml_diff>
--- a/APIDocPresentation.pptx
+++ b/APIDocPresentation.pptx
@@ -123,7 +123,7 @@
   <pc:docChgLst>
     <pc:chgData name="Saber Heart" userId="fb8b8a421b0903ca" providerId="LiveId" clId="{BFC64E79-A38C-45EF-969B-1EBFFF4C3840}"/>
     <pc:docChg chg="custSel addSld modSld">
-      <pc:chgData name="Saber Heart" userId="fb8b8a421b0903ca" providerId="LiveId" clId="{BFC64E79-A38C-45EF-969B-1EBFFF4C3840}" dt="2017-11-05T16:16:13.507" v="2165" actId="20577"/>
+      <pc:chgData name="Saber Heart" userId="fb8b8a421b0903ca" providerId="LiveId" clId="{BFC64E79-A38C-45EF-969B-1EBFFF4C3840}" dt="2017-11-05T17:43:58.584" v="2217" actId="20577"/>
       <pc:docMkLst>
         <pc:docMk/>
       </pc:docMkLst>
@@ -243,7 +243,7 @@
         </pc:spChg>
       </pc:sldChg>
       <pc:sldChg chg="modSp add">
-        <pc:chgData name="Saber Heart" userId="fb8b8a421b0903ca" providerId="LiveId" clId="{BFC64E79-A38C-45EF-969B-1EBFFF4C3840}" dt="2017-11-05T16:16:13.507" v="2165" actId="20577"/>
+        <pc:chgData name="Saber Heart" userId="fb8b8a421b0903ca" providerId="LiveId" clId="{BFC64E79-A38C-45EF-969B-1EBFFF4C3840}" dt="2017-11-05T17:43:58.584" v="2217" actId="20577"/>
         <pc:sldMkLst>
           <pc:docMk/>
           <pc:sldMk cId="2886208190" sldId="262"/>
@@ -257,7 +257,7 @@
           </ac:spMkLst>
         </pc:spChg>
         <pc:spChg chg="mod">
-          <ac:chgData name="Saber Heart" userId="fb8b8a421b0903ca" providerId="LiveId" clId="{BFC64E79-A38C-45EF-969B-1EBFFF4C3840}" dt="2017-11-05T16:16:13.507" v="2165" actId="20577"/>
+          <ac:chgData name="Saber Heart" userId="fb8b8a421b0903ca" providerId="LiveId" clId="{BFC64E79-A38C-45EF-969B-1EBFFF4C3840}" dt="2017-11-05T17:43:58.584" v="2217" actId="20577"/>
           <ac:spMkLst>
             <pc:docMk/>
             <pc:sldMk cId="2886208190" sldId="262"/>
@@ -4305,12 +4305,31 @@
             <a:pPr lvl="1"/>
             <a:r>
               <a:rPr lang="en-US" dirty="0"/>
-              <a:t>The XML response is not written </a:t>
-            </a:r>
-            <a:r>
-              <a:rPr lang="en-US"/>
-              <a:t>using attributes</a:t>
-            </a:r>
+              <a:t>The XML response is not written using attributes</a:t>
+            </a:r>
+          </a:p>
+          <a:p>
+            <a:pPr lvl="1"/>
+            <a:endParaRPr lang="en-US" dirty="0"/>
+          </a:p>
+          <a:p>
+            <a:r>
+              <a:rPr lang="en-US" dirty="0"/>
+              <a:t>Link to the GitHub Repository:</a:t>
+            </a:r>
+          </a:p>
+          <a:p>
+            <a:pPr lvl="1"/>
+            <a:r>
+              <a:rPr lang="en-US" dirty="0">
+                <a:hlinkClick r:id="rId2"/>
+              </a:rPr>
+              <a:t>https://github.com/HyderickCSarrell/CS488_APIDOCPRESENTATION</a:t>
+            </a:r>
+            <a:endParaRPr lang="en-US" dirty="0"/>
+          </a:p>
+          <a:p>
+            <a:pPr lvl="1"/>
             <a:endParaRPr lang="en-US" dirty="0"/>
           </a:p>
         </p:txBody>

</xml_diff>